<commit_message>
Revision reporte de monitoreo calidad
</commit_message>
<xml_diff>
--- a/Proyectos/2015/Métricas y monitoreo/Reporte_monitoreo_151130.pptx
+++ b/Proyectos/2015/Métricas y monitoreo/Reporte_monitoreo_151130.pptx
@@ -100,11 +100,11 @@
         </c:ser>
         <c:gapWidth val="150"/>
         <c:overlap val="0"/>
-        <c:axId val="36694241"/>
-        <c:axId val="83800548"/>
+        <c:axId val="96275700"/>
+        <c:axId val="97276583"/>
       </c:barChart>
       <c:catAx>
-        <c:axId val="36694241"/>
+        <c:axId val="96275700"/>
         <c:scaling>
           <c:orientation val="minMax"/>
         </c:scaling>
@@ -121,14 +121,14 @@
             <a:round/>
           </a:ln>
         </c:spPr>
-        <c:crossAx val="83800548"/>
+        <c:crossAx val="97276583"/>
         <c:crosses val="autoZero"/>
         <c:auto val="1"/>
         <c:lblAlgn val="ctr"/>
         <c:lblOffset val="100"/>
       </c:catAx>
       <c:valAx>
-        <c:axId val="83800548"/>
+        <c:axId val="97276583"/>
         <c:scaling>
           <c:orientation val="minMax"/>
           <c:max val="1"/>
@@ -156,7 +156,7 @@
             <a:round/>
           </a:ln>
         </c:spPr>
-        <c:crossAx val="36694241"/>
+        <c:crossAx val="96275700"/>
         <c:crosses val="autoZero"/>
       </c:valAx>
       <c:dTable>
@@ -263,11 +263,11 @@
         </c:ser>
         <c:gapWidth val="150"/>
         <c:overlap val="0"/>
-        <c:axId val="51815141"/>
-        <c:axId val="83681273"/>
+        <c:axId val="18835332"/>
+        <c:axId val="54537388"/>
       </c:barChart>
       <c:catAx>
-        <c:axId val="51815141"/>
+        <c:axId val="18835332"/>
         <c:scaling>
           <c:orientation val="minMax"/>
         </c:scaling>
@@ -284,14 +284,14 @@
             <a:round/>
           </a:ln>
         </c:spPr>
-        <c:crossAx val="83681273"/>
+        <c:crossAx val="54537388"/>
         <c:crosses val="autoZero"/>
         <c:auto val="1"/>
         <c:lblAlgn val="ctr"/>
         <c:lblOffset val="100"/>
       </c:catAx>
       <c:valAx>
-        <c:axId val="83681273"/>
+        <c:axId val="54537388"/>
         <c:scaling>
           <c:orientation val="minMax"/>
           <c:max val="1"/>
@@ -319,7 +319,7 @@
             <a:round/>
           </a:ln>
         </c:spPr>
-        <c:crossAx val="51815141"/>
+        <c:crossAx val="18835332"/>
         <c:crosses val="autoZero"/>
       </c:valAx>
       <c:dTable>
@@ -1539,7 +1539,7 @@
         <p:spPr>
           <a:xfrm>
             <a:off x="777240" y="0"/>
-            <a:ext cx="7542360" cy="379440"/>
+            <a:ext cx="7542000" cy="379080"/>
           </a:xfrm>
           <a:prstGeom prst="rect">
             <a:avLst/>
@@ -1572,7 +1572,7 @@
         <p:spPr>
           <a:xfrm>
             <a:off x="777240" y="6172200"/>
-            <a:ext cx="7542360" cy="25920"/>
+            <a:ext cx="7542000" cy="25560"/>
           </a:xfrm>
           <a:prstGeom prst="rect">
             <a:avLst/>
@@ -1623,7 +1623,7 @@
               <a:rPr lang="es-MX" sz="4400">
                 <a:latin typeface="Arial"/>
               </a:rPr>
-              <a:t>Pulse para editar el formato del texto de título</a:t>
+              <a:t>Click to edit the title text format</a:t>
             </a:r>
             <a:endParaRPr/>
           </a:p>
@@ -1660,7 +1660,7 @@
               <a:rPr lang="es-MX" sz="3200">
                 <a:latin typeface="Arial"/>
               </a:rPr>
-              <a:t>Pulse para editar el formato de esquema del texto</a:t>
+              <a:t>Click to edit the outline text format</a:t>
             </a:r>
             <a:endParaRPr/>
           </a:p>
@@ -1674,7 +1674,7 @@
               <a:rPr lang="es-MX" sz="2800">
                 <a:latin typeface="Arial"/>
               </a:rPr>
-              <a:t>Segundo nivel del esquema</a:t>
+              <a:t>Second Outline Level</a:t>
             </a:r>
             <a:endParaRPr/>
           </a:p>
@@ -1688,7 +1688,7 @@
               <a:rPr lang="es-MX" sz="2400">
                 <a:latin typeface="Arial"/>
               </a:rPr>
-              <a:t>Tercer nivel del esquema</a:t>
+              <a:t>Third Outline Level</a:t>
             </a:r>
             <a:endParaRPr/>
           </a:p>
@@ -1702,7 +1702,7 @@
               <a:rPr lang="es-MX" sz="2000">
                 <a:latin typeface="Arial"/>
               </a:rPr>
-              <a:t>Cuarto nivel del esquema</a:t>
+              <a:t>Fourth Outline Level</a:t>
             </a:r>
             <a:endParaRPr/>
           </a:p>
@@ -1716,7 +1716,7 @@
               <a:rPr lang="es-MX" sz="2000">
                 <a:latin typeface="Arial"/>
               </a:rPr>
-              <a:t>Quinto nivel del esquema</a:t>
+              <a:t>Fifth Outline Level</a:t>
             </a:r>
             <a:endParaRPr/>
           </a:p>
@@ -1730,7 +1730,7 @@
               <a:rPr lang="es-MX" sz="2000">
                 <a:latin typeface="Arial"/>
               </a:rPr>
-              <a:t>Sexto nivel del esquema</a:t>
+              <a:t>Sixth Outline Level</a:t>
             </a:r>
             <a:endParaRPr/>
           </a:p>
@@ -1744,7 +1744,7 @@
               <a:rPr lang="es-MX" sz="2000">
                 <a:latin typeface="Arial"/>
               </a:rPr>
-              <a:t>Séptimo nivel del esquema</a:t>
+              <a:t>Seventh Outline Level</a:t>
             </a:r>
             <a:endParaRPr/>
           </a:p>
@@ -1796,7 +1796,7 @@
         <p:spPr>
           <a:xfrm>
             <a:off x="1012680" y="2282760"/>
-            <a:ext cx="7769520" cy="1467000"/>
+            <a:ext cx="7769160" cy="1466640"/>
           </a:xfrm>
           <a:prstGeom prst="rect">
             <a:avLst/>
@@ -1822,7 +1822,7 @@
         <p:spPr>
           <a:xfrm>
             <a:off x="457200" y="501840"/>
-            <a:ext cx="8031240" cy="1142640"/>
+            <a:ext cx="8030880" cy="1142280"/>
           </a:xfrm>
           <a:prstGeom prst="rect">
             <a:avLst/>
@@ -1869,7 +1869,7 @@
         <p:spPr>
           <a:xfrm>
             <a:off x="457200" y="1604520"/>
-            <a:ext cx="3924000" cy="3975120"/>
+            <a:ext cx="3923640" cy="3974760"/>
           </a:xfrm>
           <a:prstGeom prst="rect">
             <a:avLst/>
@@ -1984,7 +1984,7 @@
         <p:spPr>
           <a:xfrm>
             <a:off x="6948360" y="1196640"/>
-            <a:ext cx="1913040" cy="1893960"/>
+            <a:ext cx="1912680" cy="1893600"/>
           </a:xfrm>
           <a:prstGeom prst="rect">
             <a:avLst/>
@@ -2062,7 +2062,7 @@
         <p:spPr>
           <a:xfrm>
             <a:off x="457200" y="274680"/>
-            <a:ext cx="8226720" cy="1140120"/>
+            <a:ext cx="8226360" cy="1139760"/>
           </a:xfrm>
           <a:prstGeom prst="rect">
             <a:avLst/>
@@ -2109,7 +2109,7 @@
         <p:spPr>
           <a:xfrm>
             <a:off x="457200" y="1600200"/>
-            <a:ext cx="8226720" cy="4523040"/>
+            <a:ext cx="8226360" cy="4522680"/>
           </a:xfrm>
           <a:prstGeom prst="rect">
             <a:avLst/>
@@ -2135,7 +2135,7 @@
         <p:spPr>
           <a:xfrm>
             <a:off x="163080" y="1113480"/>
-            <a:ext cx="8764560" cy="2558160"/>
+            <a:ext cx="8764200" cy="2557800"/>
           </a:xfrm>
           <a:prstGeom prst="rect">
             <a:avLst/>
@@ -2194,7 +2194,7 @@
         <p:spPr>
           <a:xfrm>
             <a:off x="-59400" y="3377160"/>
-            <a:ext cx="9059040" cy="2742480"/>
+            <a:ext cx="9058680" cy="2742120"/>
           </a:xfrm>
           <a:prstGeom prst="rect">
             <a:avLst/>
@@ -2272,7 +2272,7 @@
         <p:spPr>
           <a:xfrm>
             <a:off x="457200" y="274680"/>
-            <a:ext cx="8226720" cy="1140120"/>
+            <a:ext cx="8226360" cy="1139760"/>
           </a:xfrm>
           <a:prstGeom prst="rect">
             <a:avLst/>
@@ -2319,7 +2319,7 @@
         <p:spPr>
           <a:xfrm>
             <a:off x="457200" y="1600200"/>
-            <a:ext cx="8226720" cy="4523040"/>
+            <a:ext cx="8226360" cy="4522680"/>
           </a:xfrm>
           <a:prstGeom prst="rect">
             <a:avLst/>
@@ -2345,7 +2345,7 @@
         <p:spPr>
           <a:xfrm>
             <a:off x="6890760" y="1124640"/>
-            <a:ext cx="1852560" cy="3381120"/>
+            <a:ext cx="1852200" cy="3380760"/>
           </a:xfrm>
           <a:prstGeom prst="rect">
             <a:avLst/>
@@ -2399,7 +2399,7 @@
         </p:nvGraphicFramePr>
         <p:xfrm>
           <a:off x="259560" y="1329480"/>
-          <a:ext cx="6436080" cy="3190320"/>
+          <a:ext cx="6436080" cy="3189960"/>
         </p:xfrm>
         <a:graphic>
           <a:graphicData uri="http://schemas.openxmlformats.org/drawingml/2006/table">
@@ -2760,7 +2760,7 @@
         </p:nvGraphicFramePr>
         <p:xfrm>
           <a:off x="272160" y="4576320"/>
-          <a:ext cx="5559480" cy="1652760"/>
+          <a:ext cx="5559480" cy="1652400"/>
         </p:xfrm>
         <a:graphic>
           <a:graphicData uri="http://schemas.openxmlformats.org/drawingml/2006/table">
@@ -3023,7 +3023,7 @@
         <p:spPr>
           <a:xfrm>
             <a:off x="457200" y="274680"/>
-            <a:ext cx="8226720" cy="1140120"/>
+            <a:ext cx="8226360" cy="1139760"/>
           </a:xfrm>
           <a:prstGeom prst="rect">
             <a:avLst/>
@@ -3070,7 +3070,7 @@
         <p:spPr>
           <a:xfrm>
             <a:off x="457200" y="1600200"/>
-            <a:ext cx="8226720" cy="4523040"/>
+            <a:ext cx="8226360" cy="4522680"/>
           </a:xfrm>
           <a:prstGeom prst="rect">
             <a:avLst/>
@@ -3096,7 +3096,7 @@
         <p:spPr>
           <a:xfrm>
             <a:off x="5751360" y="1412640"/>
-            <a:ext cx="2932560" cy="2283840"/>
+            <a:ext cx="2932200" cy="2283480"/>
           </a:xfrm>
           <a:prstGeom prst="rect">
             <a:avLst/>
@@ -3210,7 +3210,7 @@
         <p:spPr>
           <a:xfrm>
             <a:off x="457200" y="274680"/>
-            <a:ext cx="8226720" cy="1140120"/>
+            <a:ext cx="8226360" cy="1139760"/>
           </a:xfrm>
           <a:prstGeom prst="rect">
             <a:avLst/>
@@ -3257,7 +3257,7 @@
         <p:spPr>
           <a:xfrm>
             <a:off x="457200" y="1600200"/>
-            <a:ext cx="8226720" cy="4523040"/>
+            <a:ext cx="8226360" cy="4522680"/>
           </a:xfrm>
           <a:prstGeom prst="rect">
             <a:avLst/>
@@ -3282,7 +3282,7 @@
         </p:nvGraphicFramePr>
         <p:xfrm>
           <a:off x="1523880" y="1397160"/>
-          <a:ext cx="6094080" cy="1812600"/>
+          <a:ext cx="6093720" cy="1812960"/>
         </p:xfrm>
         <a:graphic>
           <a:graphicData uri="http://schemas.openxmlformats.org/drawingml/2006/table">
@@ -3577,7 +3577,7 @@
         <p:spPr>
           <a:xfrm>
             <a:off x="457200" y="274680"/>
-            <a:ext cx="8226720" cy="1140120"/>
+            <a:ext cx="8226360" cy="1139760"/>
           </a:xfrm>
           <a:prstGeom prst="rect">
             <a:avLst/>
@@ -3624,7 +3624,7 @@
         <p:spPr>
           <a:xfrm>
             <a:off x="457200" y="1600200"/>
-            <a:ext cx="8226720" cy="4523040"/>
+            <a:ext cx="8226360" cy="4522680"/>
           </a:xfrm>
           <a:prstGeom prst="rect">
             <a:avLst/>
@@ -3668,7 +3668,7 @@
         </p:nvGraphicFramePr>
         <p:xfrm>
           <a:off x="36360" y="1579680"/>
-          <a:ext cx="9078120" cy="5264280"/>
+          <a:ext cx="9078120" cy="5263920"/>
         </p:xfrm>
         <a:graphic>
           <a:graphicData uri="http://schemas.openxmlformats.org/drawingml/2006/table">
@@ -4243,7 +4243,7 @@
         <p:spPr>
           <a:xfrm>
             <a:off x="144000" y="1080000"/>
-            <a:ext cx="1511640" cy="345960"/>
+            <a:ext cx="1511280" cy="345600"/>
           </a:xfrm>
           <a:prstGeom prst="rect">
             <a:avLst/>
@@ -4264,7 +4264,11 @@
           <a:p>
             <a:r>
               <a:rPr lang="es-MX" strike="noStrike">
+                <a:solidFill>
+                  <a:srgbClr val="000000"/>
+                </a:solidFill>
                 <a:latin typeface="Arial"/>
+                <a:ea typeface="DejaVu Sans"/>
               </a:rPr>
               <a:t>P1319</a:t>
             </a:r>
@@ -4340,7 +4344,7 @@
         <p:spPr>
           <a:xfrm>
             <a:off x="576000" y="1080000"/>
-            <a:ext cx="7991640" cy="601920"/>
+            <a:ext cx="7991280" cy="601560"/>
           </a:xfrm>
           <a:prstGeom prst="rect">
             <a:avLst/>
@@ -4361,7 +4365,11 @@
           <a:p>
             <a:r>
               <a:rPr lang="es-MX" strike="noStrike">
+                <a:solidFill>
+                  <a:srgbClr val="000000"/>
+                </a:solidFill>
                 <a:latin typeface="Arial"/>
+                <a:ea typeface="DejaVu Sans"/>
               </a:rPr>
               <a:t>Para la realización del proyecto p1319 no se requirió capacitación en alguna de las áreas</a:t>
             </a:r>
@@ -4427,7 +4435,7 @@
         <p:spPr>
           <a:xfrm>
             <a:off x="457200" y="274680"/>
-            <a:ext cx="8226720" cy="1140120"/>
+            <a:ext cx="8226360" cy="1139760"/>
           </a:xfrm>
           <a:prstGeom prst="rect">
             <a:avLst/>
@@ -4474,7 +4482,7 @@
         <p:spPr>
           <a:xfrm>
             <a:off x="457200" y="1600200"/>
-            <a:ext cx="8226720" cy="4523040"/>
+            <a:ext cx="8226360" cy="4522680"/>
           </a:xfrm>
           <a:prstGeom prst="rect">
             <a:avLst/>
@@ -4500,7 +4508,7 @@
         <p:spPr>
           <a:xfrm>
             <a:off x="792000" y="3990240"/>
-            <a:ext cx="7990920" cy="2283840"/>
+            <a:ext cx="7990560" cy="2283480"/>
           </a:xfrm>
           <a:prstGeom prst="rect">
             <a:avLst/>
@@ -4554,7 +4562,7 @@
         </p:nvGraphicFramePr>
         <p:xfrm>
           <a:off x="273960" y="1285200"/>
-          <a:ext cx="6078600" cy="2524320"/>
+          <a:ext cx="6078600" cy="2689920"/>
         </p:xfrm>
         <a:graphic>
           <a:graphicData uri="http://schemas.openxmlformats.org/drawingml/2006/table">
@@ -5257,7 +5265,7 @@
         <p:spPr>
           <a:xfrm>
             <a:off x="457200" y="274680"/>
-            <a:ext cx="8226720" cy="1140120"/>
+            <a:ext cx="8226360" cy="1139760"/>
           </a:xfrm>
           <a:prstGeom prst="rect">
             <a:avLst/>
@@ -5304,7 +5312,7 @@
         <p:spPr>
           <a:xfrm>
             <a:off x="457200" y="1600200"/>
-            <a:ext cx="8226720" cy="4523040"/>
+            <a:ext cx="8226360" cy="4522680"/>
           </a:xfrm>
           <a:prstGeom prst="rect">
             <a:avLst/>
@@ -5330,7 +5338,7 @@
         <p:spPr>
           <a:xfrm>
             <a:off x="5868000" y="1340640"/>
-            <a:ext cx="3076560" cy="1735200"/>
+            <a:ext cx="3076200" cy="1734840"/>
           </a:xfrm>
           <a:prstGeom prst="rect">
             <a:avLst/>
@@ -5376,7 +5384,7 @@
         </p:nvGraphicFramePr>
         <p:xfrm>
           <a:off x="139320" y="1185120"/>
-          <a:ext cx="5727960" cy="2524320"/>
+          <a:ext cx="5727960" cy="2689920"/>
         </p:xfrm>
         <a:graphic>
           <a:graphicData uri="http://schemas.openxmlformats.org/drawingml/2006/table">
@@ -5989,7 +5997,7 @@
         <p:spPr>
           <a:xfrm>
             <a:off x="457200" y="274680"/>
-            <a:ext cx="8226720" cy="1140120"/>
+            <a:ext cx="8226360" cy="1139760"/>
           </a:xfrm>
           <a:prstGeom prst="rect">
             <a:avLst/>
@@ -6036,7 +6044,7 @@
         <p:spPr>
           <a:xfrm>
             <a:off x="457200" y="1600200"/>
-            <a:ext cx="8226720" cy="4523040"/>
+            <a:ext cx="8226360" cy="4522680"/>
           </a:xfrm>
           <a:prstGeom prst="rect">
             <a:avLst/>
@@ -6062,7 +6070,7 @@
         <p:spPr>
           <a:xfrm>
             <a:off x="6365160" y="1124640"/>
-            <a:ext cx="2285280" cy="3106800"/>
+            <a:ext cx="2284920" cy="3106440"/>
           </a:xfrm>
           <a:prstGeom prst="rect">
             <a:avLst/>
@@ -6116,7 +6124,7 @@
         </p:nvGraphicFramePr>
         <p:xfrm>
           <a:off x="576000" y="1944000"/>
-          <a:ext cx="5790600" cy="2855880"/>
+          <a:ext cx="5790240" cy="2855520"/>
         </p:xfrm>
         <a:graphic>
           <a:graphicData uri="http://schemas.openxmlformats.org/drawingml/2006/chart">
@@ -6192,7 +6200,7 @@
         <p:spPr>
           <a:xfrm>
             <a:off x="457200" y="274680"/>
-            <a:ext cx="8226720" cy="1140120"/>
+            <a:ext cx="8226360" cy="1139760"/>
           </a:xfrm>
           <a:prstGeom prst="rect">
             <a:avLst/>
@@ -6239,7 +6247,7 @@
         <p:spPr>
           <a:xfrm>
             <a:off x="457200" y="1600200"/>
-            <a:ext cx="8226720" cy="4523040"/>
+            <a:ext cx="8226360" cy="4522680"/>
           </a:xfrm>
           <a:prstGeom prst="rect">
             <a:avLst/>
@@ -6265,7 +6273,7 @@
         <p:spPr>
           <a:xfrm>
             <a:off x="6183360" y="1416240"/>
-            <a:ext cx="2500560" cy="2832480"/>
+            <a:ext cx="2500200" cy="2832120"/>
           </a:xfrm>
           <a:prstGeom prst="rect">
             <a:avLst/>
@@ -6335,7 +6343,7 @@
         </p:nvGraphicFramePr>
         <p:xfrm>
           <a:off x="72000" y="1463760"/>
-          <a:ext cx="5859000" cy="2855880"/>
+          <a:ext cx="5858640" cy="2855520"/>
         </p:xfrm>
         <a:graphic>
           <a:graphicData uri="http://schemas.openxmlformats.org/drawingml/2006/chart">
@@ -6411,7 +6419,7 @@
         <p:spPr>
           <a:xfrm>
             <a:off x="457200" y="274680"/>
-            <a:ext cx="8226720" cy="1140120"/>
+            <a:ext cx="8226360" cy="1139760"/>
           </a:xfrm>
           <a:prstGeom prst="rect">
             <a:avLst/>
@@ -6458,7 +6466,7 @@
         <p:spPr>
           <a:xfrm>
             <a:off x="457200" y="1600200"/>
-            <a:ext cx="8226720" cy="4523040"/>
+            <a:ext cx="8226360" cy="4522680"/>
           </a:xfrm>
           <a:prstGeom prst="rect">
             <a:avLst/>
@@ -6484,7 +6492,7 @@
         <p:spPr>
           <a:xfrm>
             <a:off x="6375960" y="1416240"/>
-            <a:ext cx="2285280" cy="3106800"/>
+            <a:ext cx="2284920" cy="3106440"/>
           </a:xfrm>
           <a:prstGeom prst="rect">
             <a:avLst/>
@@ -6543,7 +6551,7 @@
         <p:spPr>
           <a:xfrm>
             <a:off x="92880" y="1296000"/>
-            <a:ext cx="6386760" cy="2824200"/>
+            <a:ext cx="6386400" cy="2823840"/>
           </a:xfrm>
           <a:prstGeom prst="rect">
             <a:avLst/>

</xml_diff>